<commit_message>
update presentation and add pdf of the presentation
</commit_message>
<xml_diff>
--- a/Presentation/Gruppe10(Präsentation2) .pptx
+++ b/Presentation/Gruppe10(Präsentation2) .pptx
@@ -5,7 +5,7 @@
     <p:sldMasterId id="2147483870" r:id="rId1"/>
   </p:sldMasterIdLst>
   <p:notesMasterIdLst>
-    <p:notesMasterId r:id="rId11"/>
+    <p:notesMasterId r:id="rId17"/>
   </p:notesMasterIdLst>
   <p:sldIdLst>
     <p:sldId id="256" r:id="rId2"/>
@@ -17,6 +17,12 @@
     <p:sldId id="274" r:id="rId8"/>
     <p:sldId id="268" r:id="rId9"/>
     <p:sldId id="269" r:id="rId10"/>
+    <p:sldId id="275" r:id="rId11"/>
+    <p:sldId id="276" r:id="rId12"/>
+    <p:sldId id="277" r:id="rId13"/>
+    <p:sldId id="278" r:id="rId14"/>
+    <p:sldId id="279" r:id="rId15"/>
+    <p:sldId id="280" r:id="rId16"/>
   </p:sldIdLst>
   <p:sldSz cx="12192000" cy="6858000"/>
   <p:notesSz cx="6858000" cy="9144000"/>
@@ -205,7 +211,7 @@
           <a:p>
             <a:fld id="{69C57565-D9A9-42DC-8E72-54DE571BFA9D}" type="datetimeFigureOut">
               <a:rPr lang="de-CH" smtClean="0"/>
-              <a:t>08.04.2025</a:t>
+              <a:t>09.04.2025</a:t>
             </a:fld>
             <a:endParaRPr lang="de-CH"/>
           </a:p>
@@ -364,7 +370,7 @@
           <a:p>
             <a:fld id="{B317077F-0BF6-4AB1-A0A2-447321C31DAC}" type="slidenum">
               <a:rPr lang="de-CH" smtClean="0"/>
-              <a:t>‹#›</a:t>
+              <a:t>‹Nr.›</a:t>
             </a:fld>
             <a:endParaRPr lang="de-CH"/>
           </a:p>
@@ -706,7 +712,7 @@
           <a:p>
             <a:fld id="{75010D13-5421-45FB-91B5-734B751F6B9F}" type="datetimeFigureOut">
               <a:rPr lang="de-CH" smtClean="0"/>
-              <a:t>08.04.2025</a:t>
+              <a:t>09.04.2025</a:t>
             </a:fld>
             <a:endParaRPr lang="de-CH"/>
           </a:p>
@@ -760,7 +766,7 @@
           <a:p>
             <a:fld id="{BD6BDAE4-A718-497F-BD43-B43AF474C268}" type="slidenum">
               <a:rPr lang="de-CH" smtClean="0"/>
-              <a:t>‹#›</a:t>
+              <a:t>‹Nr.›</a:t>
             </a:fld>
             <a:endParaRPr lang="de-CH"/>
           </a:p>
@@ -906,7 +912,7 @@
           <a:p>
             <a:fld id="{75010D13-5421-45FB-91B5-734B751F6B9F}" type="datetimeFigureOut">
               <a:rPr lang="de-CH" smtClean="0"/>
-              <a:t>08.04.2025</a:t>
+              <a:t>09.04.2025</a:t>
             </a:fld>
             <a:endParaRPr lang="de-CH"/>
           </a:p>
@@ -960,7 +966,7 @@
           <a:p>
             <a:fld id="{BD6BDAE4-A718-497F-BD43-B43AF474C268}" type="slidenum">
               <a:rPr lang="de-CH" smtClean="0"/>
-              <a:t>‹#›</a:t>
+              <a:t>‹Nr.›</a:t>
             </a:fld>
             <a:endParaRPr lang="de-CH"/>
           </a:p>
@@ -1116,7 +1122,7 @@
           <a:p>
             <a:fld id="{75010D13-5421-45FB-91B5-734B751F6B9F}" type="datetimeFigureOut">
               <a:rPr lang="de-CH" smtClean="0"/>
-              <a:t>08.04.2025</a:t>
+              <a:t>09.04.2025</a:t>
             </a:fld>
             <a:endParaRPr lang="de-CH"/>
           </a:p>
@@ -1170,7 +1176,7 @@
           <a:p>
             <a:fld id="{BD6BDAE4-A718-497F-BD43-B43AF474C268}" type="slidenum">
               <a:rPr lang="de-CH" smtClean="0"/>
-              <a:t>‹#›</a:t>
+              <a:t>‹Nr.›</a:t>
             </a:fld>
             <a:endParaRPr lang="de-CH"/>
           </a:p>
@@ -1316,7 +1322,7 @@
           <a:p>
             <a:fld id="{75010D13-5421-45FB-91B5-734B751F6B9F}" type="datetimeFigureOut">
               <a:rPr lang="de-CH" smtClean="0"/>
-              <a:t>08.04.2025</a:t>
+              <a:t>09.04.2025</a:t>
             </a:fld>
             <a:endParaRPr lang="de-CH"/>
           </a:p>
@@ -1370,7 +1376,7 @@
           <a:p>
             <a:fld id="{BD6BDAE4-A718-497F-BD43-B43AF474C268}" type="slidenum">
               <a:rPr lang="de-CH" smtClean="0"/>
-              <a:t>‹#›</a:t>
+              <a:t>‹Nr.›</a:t>
             </a:fld>
             <a:endParaRPr lang="de-CH"/>
           </a:p>
@@ -1592,7 +1598,7 @@
           <a:p>
             <a:fld id="{75010D13-5421-45FB-91B5-734B751F6B9F}" type="datetimeFigureOut">
               <a:rPr lang="de-CH" smtClean="0"/>
-              <a:t>08.04.2025</a:t>
+              <a:t>09.04.2025</a:t>
             </a:fld>
             <a:endParaRPr lang="de-CH"/>
           </a:p>
@@ -1646,7 +1652,7 @@
           <a:p>
             <a:fld id="{BD6BDAE4-A718-497F-BD43-B43AF474C268}" type="slidenum">
               <a:rPr lang="de-CH" smtClean="0"/>
-              <a:t>‹#›</a:t>
+              <a:t>‹Nr.›</a:t>
             </a:fld>
             <a:endParaRPr lang="de-CH"/>
           </a:p>
@@ -1860,7 +1866,7 @@
           <a:p>
             <a:fld id="{75010D13-5421-45FB-91B5-734B751F6B9F}" type="datetimeFigureOut">
               <a:rPr lang="de-CH" smtClean="0"/>
-              <a:t>08.04.2025</a:t>
+              <a:t>09.04.2025</a:t>
             </a:fld>
             <a:endParaRPr lang="de-CH"/>
           </a:p>
@@ -1914,7 +1920,7 @@
           <a:p>
             <a:fld id="{BD6BDAE4-A718-497F-BD43-B43AF474C268}" type="slidenum">
               <a:rPr lang="de-CH" smtClean="0"/>
-              <a:t>‹#›</a:t>
+              <a:t>‹Nr.›</a:t>
             </a:fld>
             <a:endParaRPr lang="de-CH"/>
           </a:p>
@@ -2275,7 +2281,7 @@
           <a:p>
             <a:fld id="{75010D13-5421-45FB-91B5-734B751F6B9F}" type="datetimeFigureOut">
               <a:rPr lang="de-CH" smtClean="0"/>
-              <a:t>08.04.2025</a:t>
+              <a:t>09.04.2025</a:t>
             </a:fld>
             <a:endParaRPr lang="de-CH"/>
           </a:p>
@@ -2329,7 +2335,7 @@
           <a:p>
             <a:fld id="{BD6BDAE4-A718-497F-BD43-B43AF474C268}" type="slidenum">
               <a:rPr lang="de-CH" smtClean="0"/>
-              <a:t>‹#›</a:t>
+              <a:t>‹Nr.›</a:t>
             </a:fld>
             <a:endParaRPr lang="de-CH"/>
           </a:p>
@@ -2417,7 +2423,7 @@
           <a:p>
             <a:fld id="{75010D13-5421-45FB-91B5-734B751F6B9F}" type="datetimeFigureOut">
               <a:rPr lang="de-CH" smtClean="0"/>
-              <a:t>08.04.2025</a:t>
+              <a:t>09.04.2025</a:t>
             </a:fld>
             <a:endParaRPr lang="de-CH"/>
           </a:p>
@@ -2471,7 +2477,7 @@
           <a:p>
             <a:fld id="{BD6BDAE4-A718-497F-BD43-B43AF474C268}" type="slidenum">
               <a:rPr lang="de-CH" smtClean="0"/>
-              <a:t>‹#›</a:t>
+              <a:t>‹Nr.›</a:t>
             </a:fld>
             <a:endParaRPr lang="de-CH"/>
           </a:p>
@@ -2530,7 +2536,7 @@
           <a:p>
             <a:fld id="{75010D13-5421-45FB-91B5-734B751F6B9F}" type="datetimeFigureOut">
               <a:rPr lang="de-CH" smtClean="0"/>
-              <a:t>08.04.2025</a:t>
+              <a:t>09.04.2025</a:t>
             </a:fld>
             <a:endParaRPr lang="de-CH"/>
           </a:p>
@@ -2584,7 +2590,7 @@
           <a:p>
             <a:fld id="{BD6BDAE4-A718-497F-BD43-B43AF474C268}" type="slidenum">
               <a:rPr lang="de-CH" smtClean="0"/>
-              <a:t>‹#›</a:t>
+              <a:t>‹Nr.›</a:t>
             </a:fld>
             <a:endParaRPr lang="de-CH"/>
           </a:p>
@@ -2843,7 +2849,7 @@
           <a:p>
             <a:fld id="{75010D13-5421-45FB-91B5-734B751F6B9F}" type="datetimeFigureOut">
               <a:rPr lang="de-CH" smtClean="0"/>
-              <a:t>08.04.2025</a:t>
+              <a:t>09.04.2025</a:t>
             </a:fld>
             <a:endParaRPr lang="de-CH"/>
           </a:p>
@@ -2897,7 +2903,7 @@
           <a:p>
             <a:fld id="{BD6BDAE4-A718-497F-BD43-B43AF474C268}" type="slidenum">
               <a:rPr lang="de-CH" smtClean="0"/>
-              <a:t>‹#›</a:t>
+              <a:t>‹Nr.›</a:t>
             </a:fld>
             <a:endParaRPr lang="de-CH"/>
           </a:p>
@@ -3132,7 +3138,7 @@
           <a:p>
             <a:fld id="{75010D13-5421-45FB-91B5-734B751F6B9F}" type="datetimeFigureOut">
               <a:rPr lang="de-CH" smtClean="0"/>
-              <a:t>08.04.2025</a:t>
+              <a:t>09.04.2025</a:t>
             </a:fld>
             <a:endParaRPr lang="de-CH"/>
           </a:p>
@@ -3186,7 +3192,7 @@
           <a:p>
             <a:fld id="{BD6BDAE4-A718-497F-BD43-B43AF474C268}" type="slidenum">
               <a:rPr lang="de-CH" smtClean="0"/>
-              <a:t>‹#›</a:t>
+              <a:t>‹Nr.›</a:t>
             </a:fld>
             <a:endParaRPr lang="de-CH"/>
           </a:p>
@@ -3375,7 +3381,7 @@
           <a:p>
             <a:fld id="{75010D13-5421-45FB-91B5-734B751F6B9F}" type="datetimeFigureOut">
               <a:rPr lang="de-CH" smtClean="0"/>
-              <a:t>08.04.2025</a:t>
+              <a:t>09.04.2025</a:t>
             </a:fld>
             <a:endParaRPr lang="de-CH"/>
           </a:p>
@@ -3465,7 +3471,7 @@
           <a:p>
             <a:fld id="{BD6BDAE4-A718-497F-BD43-B43AF474C268}" type="slidenum">
               <a:rPr lang="de-CH" smtClean="0"/>
-              <a:t>‹#›</a:t>
+              <a:t>‹Nr.›</a:t>
             </a:fld>
             <a:endParaRPr lang="de-CH"/>
           </a:p>
@@ -3979,6 +3985,1081 @@
     <p:extLst>
       <p:ext uri="{BB962C8B-B14F-4D97-AF65-F5344CB8AC3E}">
         <p14:creationId xmlns:p14="http://schemas.microsoft.com/office/powerpoint/2010/main" val="2695116325"/>
+      </p:ext>
+    </p:extLst>
+  </p:cSld>
+  <p:clrMapOvr>
+    <a:masterClrMapping/>
+  </p:clrMapOvr>
+</p:sld>
+</file>
+
+<file path=ppt/slides/slide10.xml><?xml version="1.0" encoding="utf-8"?>
+<p:sld xmlns:a="http://schemas.openxmlformats.org/drawingml/2006/main" xmlns:r="http://schemas.openxmlformats.org/officeDocument/2006/relationships" xmlns:p="http://schemas.openxmlformats.org/presentationml/2006/main">
+  <p:cSld>
+    <p:spTree>
+      <p:nvGrpSpPr>
+        <p:cNvPr id="1" name="">
+          <a:extLst>
+            <a:ext uri="{FF2B5EF4-FFF2-40B4-BE49-F238E27FC236}">
+              <a16:creationId xmlns:a16="http://schemas.microsoft.com/office/drawing/2014/main" id="{1C89E99E-8538-5111-F123-D032EF8FA454}"/>
+            </a:ext>
+          </a:extLst>
+        </p:cNvPr>
+        <p:cNvGrpSpPr/>
+        <p:nvPr/>
+      </p:nvGrpSpPr>
+      <p:grpSpPr>
+        <a:xfrm>
+          <a:off x="0" y="0"/>
+          <a:ext cx="0" cy="0"/>
+          <a:chOff x="0" y="0"/>
+          <a:chExt cx="0" cy="0"/>
+        </a:xfrm>
+      </p:grpSpPr>
+      <p:sp>
+        <p:nvSpPr>
+          <p:cNvPr id="10" name="Title 1">
+            <a:extLst>
+              <a:ext uri="{FF2B5EF4-FFF2-40B4-BE49-F238E27FC236}">
+                <a16:creationId xmlns:a16="http://schemas.microsoft.com/office/drawing/2014/main" id="{797D2299-91A9-CFE6-A5D8-D4C689D709A7}"/>
+              </a:ext>
+            </a:extLst>
+          </p:cNvPr>
+          <p:cNvSpPr txBox="1">
+            <a:spLocks/>
+          </p:cNvSpPr>
+          <p:nvPr/>
+        </p:nvSpPr>
+        <p:spPr>
+          <a:xfrm>
+            <a:off x="554181" y="434109"/>
+            <a:ext cx="11083637" cy="951345"/>
+          </a:xfrm>
+          <a:prstGeom prst="rect">
+            <a:avLst/>
+          </a:prstGeom>
+          <a:solidFill>
+            <a:schemeClr val="tx1"/>
+          </a:solidFill>
+          <a:ln>
+            <a:solidFill>
+              <a:schemeClr val="tx1">
+                <a:lumMod val="95000"/>
+                <a:lumOff val="5000"/>
+              </a:schemeClr>
+            </a:solidFill>
+          </a:ln>
+          <a:effectLst>
+            <a:outerShdw blurRad="50800" dist="114300" dir="2940000" rotWithShape="0">
+              <a:prstClr val="black">
+                <a:alpha val="41000"/>
+              </a:prstClr>
+            </a:outerShdw>
+          </a:effectLst>
+        </p:spPr>
+        <p:txBody>
+          <a:bodyPr vert="horz" lIns="91440" tIns="45720" rIns="91440" bIns="45720" rtlCol="0" anchor="ctr">
+            <a:normAutofit/>
+          </a:bodyPr>
+          <a:lstStyle>
+            <a:lvl1pPr algn="ctr">
+              <a:lnSpc>
+                <a:spcPct val="90000"/>
+              </a:lnSpc>
+              <a:spcBef>
+                <a:spcPct val="0"/>
+              </a:spcBef>
+              <a:buNone/>
+              <a:defRPr sz="4000">
+                <a:solidFill>
+                  <a:schemeClr val="bg1"/>
+                </a:solidFill>
+                <a:latin typeface="Futuro"/>
+                <a:ea typeface="+mj-ea"/>
+                <a:cs typeface="Arial" panose="020B0604020202020204" pitchFamily="34" charset="0"/>
+              </a:defRPr>
+            </a:lvl1pPr>
+          </a:lstStyle>
+          <a:p>
+            <a:r>
+              <a:rPr lang="de-CH" dirty="0"/>
+              <a:t>QA: First </a:t>
+            </a:r>
+            <a:r>
+              <a:rPr lang="de-CH" dirty="0" err="1"/>
+              <a:t>Measurements</a:t>
+            </a:r>
+            <a:endParaRPr lang="de-CH" dirty="0"/>
+          </a:p>
+        </p:txBody>
+      </p:sp>
+      <p:pic>
+        <p:nvPicPr>
+          <p:cNvPr id="3" name="Grafik 2" descr="Ein Bild, das Text, Screenshot, Schrift, Reihe enthält.&#10;&#10;KI-generierte Inhalte können fehlerhaft sein.">
+            <a:extLst>
+              <a:ext uri="{FF2B5EF4-FFF2-40B4-BE49-F238E27FC236}">
+                <a16:creationId xmlns:a16="http://schemas.microsoft.com/office/drawing/2014/main" id="{7CB5BD8B-DFBD-A142-3C66-2E5B881D8C0E}"/>
+              </a:ext>
+            </a:extLst>
+          </p:cNvPr>
+          <p:cNvPicPr>
+            <a:picLocks noChangeAspect="1"/>
+          </p:cNvPicPr>
+          <p:nvPr/>
+        </p:nvPicPr>
+        <p:blipFill>
+          <a:blip r:embed="rId2">
+            <a:extLst>
+              <a:ext uri="{28A0092B-C50C-407E-A947-70E740481C1C}">
+                <a14:useLocalDpi xmlns:a14="http://schemas.microsoft.com/office/drawing/2010/main" val="0"/>
+              </a:ext>
+            </a:extLst>
+          </a:blip>
+          <a:stretch>
+            <a:fillRect/>
+          </a:stretch>
+        </p:blipFill>
+        <p:spPr>
+          <a:xfrm>
+            <a:off x="1351961" y="3439113"/>
+            <a:ext cx="9488077" cy="961459"/>
+          </a:xfrm>
+          <a:prstGeom prst="rect">
+            <a:avLst/>
+          </a:prstGeom>
+        </p:spPr>
+      </p:pic>
+      <p:pic>
+        <p:nvPicPr>
+          <p:cNvPr id="5" name="Grafik 4" descr="Ein Bild, das Text, Screenshot, Schrift, Reihe enthält.&#10;&#10;KI-generierte Inhalte können fehlerhaft sein.">
+            <a:extLst>
+              <a:ext uri="{FF2B5EF4-FFF2-40B4-BE49-F238E27FC236}">
+                <a16:creationId xmlns:a16="http://schemas.microsoft.com/office/drawing/2014/main" id="{5B0DE6A0-46CE-5D9A-79EB-F34E6AEB37C6}"/>
+              </a:ext>
+            </a:extLst>
+          </p:cNvPr>
+          <p:cNvPicPr>
+            <a:picLocks noChangeAspect="1"/>
+          </p:cNvPicPr>
+          <p:nvPr/>
+        </p:nvPicPr>
+        <p:blipFill>
+          <a:blip r:embed="rId3">
+            <a:extLst>
+              <a:ext uri="{28A0092B-C50C-407E-A947-70E740481C1C}">
+                <a14:useLocalDpi xmlns:a14="http://schemas.microsoft.com/office/drawing/2010/main" val="0"/>
+              </a:ext>
+            </a:extLst>
+          </a:blip>
+          <a:stretch>
+            <a:fillRect/>
+          </a:stretch>
+        </p:blipFill>
+        <p:spPr>
+          <a:xfrm>
+            <a:off x="1351961" y="2072189"/>
+            <a:ext cx="9488077" cy="951345"/>
+          </a:xfrm>
+          <a:prstGeom prst="rect">
+            <a:avLst/>
+          </a:prstGeom>
+        </p:spPr>
+      </p:pic>
+    </p:spTree>
+    <p:extLst>
+      <p:ext uri="{BB962C8B-B14F-4D97-AF65-F5344CB8AC3E}">
+        <p14:creationId xmlns:p14="http://schemas.microsoft.com/office/powerpoint/2010/main" val="3021680443"/>
+      </p:ext>
+    </p:extLst>
+  </p:cSld>
+  <p:clrMapOvr>
+    <a:masterClrMapping/>
+  </p:clrMapOvr>
+</p:sld>
+</file>
+
+<file path=ppt/slides/slide11.xml><?xml version="1.0" encoding="utf-8"?>
+<p:sld xmlns:a="http://schemas.openxmlformats.org/drawingml/2006/main" xmlns:r="http://schemas.openxmlformats.org/officeDocument/2006/relationships" xmlns:p="http://schemas.openxmlformats.org/presentationml/2006/main">
+  <p:cSld>
+    <p:spTree>
+      <p:nvGrpSpPr>
+        <p:cNvPr id="1" name="">
+          <a:extLst>
+            <a:ext uri="{FF2B5EF4-FFF2-40B4-BE49-F238E27FC236}">
+              <a16:creationId xmlns:a16="http://schemas.microsoft.com/office/drawing/2014/main" id="{975918EA-6CE4-0131-BABB-61467CB2B062}"/>
+            </a:ext>
+          </a:extLst>
+        </p:cNvPr>
+        <p:cNvGrpSpPr/>
+        <p:nvPr/>
+      </p:nvGrpSpPr>
+      <p:grpSpPr>
+        <a:xfrm>
+          <a:off x="0" y="0"/>
+          <a:ext cx="0" cy="0"/>
+          <a:chOff x="0" y="0"/>
+          <a:chExt cx="0" cy="0"/>
+        </a:xfrm>
+      </p:grpSpPr>
+      <p:sp>
+        <p:nvSpPr>
+          <p:cNvPr id="10" name="Title 1">
+            <a:extLst>
+              <a:ext uri="{FF2B5EF4-FFF2-40B4-BE49-F238E27FC236}">
+                <a16:creationId xmlns:a16="http://schemas.microsoft.com/office/drawing/2014/main" id="{B4CD96C1-1732-C397-6F00-E8BC5037A958}"/>
+              </a:ext>
+            </a:extLst>
+          </p:cNvPr>
+          <p:cNvSpPr txBox="1">
+            <a:spLocks/>
+          </p:cNvSpPr>
+          <p:nvPr/>
+        </p:nvSpPr>
+        <p:spPr>
+          <a:xfrm>
+            <a:off x="554181" y="434109"/>
+            <a:ext cx="11083637" cy="951345"/>
+          </a:xfrm>
+          <a:prstGeom prst="rect">
+            <a:avLst/>
+          </a:prstGeom>
+          <a:solidFill>
+            <a:schemeClr val="tx1"/>
+          </a:solidFill>
+          <a:ln>
+            <a:solidFill>
+              <a:schemeClr val="tx1">
+                <a:lumMod val="95000"/>
+                <a:lumOff val="5000"/>
+              </a:schemeClr>
+            </a:solidFill>
+          </a:ln>
+          <a:effectLst>
+            <a:outerShdw blurRad="50800" dist="114300" dir="2940000" rotWithShape="0">
+              <a:prstClr val="black">
+                <a:alpha val="41000"/>
+              </a:prstClr>
+            </a:outerShdw>
+          </a:effectLst>
+        </p:spPr>
+        <p:txBody>
+          <a:bodyPr vert="horz" lIns="91440" tIns="45720" rIns="91440" bIns="45720" rtlCol="0" anchor="ctr">
+            <a:normAutofit/>
+          </a:bodyPr>
+          <a:lstStyle>
+            <a:lvl1pPr algn="ctr">
+              <a:lnSpc>
+                <a:spcPct val="90000"/>
+              </a:lnSpc>
+              <a:spcBef>
+                <a:spcPct val="0"/>
+              </a:spcBef>
+              <a:buNone/>
+              <a:defRPr sz="4000">
+                <a:solidFill>
+                  <a:schemeClr val="bg1"/>
+                </a:solidFill>
+                <a:latin typeface="Futuro"/>
+                <a:ea typeface="+mj-ea"/>
+                <a:cs typeface="Arial" panose="020B0604020202020204" pitchFamily="34" charset="0"/>
+              </a:defRPr>
+            </a:lvl1pPr>
+          </a:lstStyle>
+          <a:p>
+            <a:r>
+              <a:rPr lang="de-CH" dirty="0"/>
+              <a:t>Libraries</a:t>
+            </a:r>
+          </a:p>
+        </p:txBody>
+      </p:sp>
+      <p:sp>
+        <p:nvSpPr>
+          <p:cNvPr id="2" name="Textfeld 1">
+            <a:extLst>
+              <a:ext uri="{FF2B5EF4-FFF2-40B4-BE49-F238E27FC236}">
+                <a16:creationId xmlns:a16="http://schemas.microsoft.com/office/drawing/2014/main" id="{F07D3837-92FA-CCC9-C637-19EA348D5DB1}"/>
+              </a:ext>
+            </a:extLst>
+          </p:cNvPr>
+          <p:cNvSpPr txBox="1"/>
+          <p:nvPr/>
+        </p:nvSpPr>
+        <p:spPr>
+          <a:xfrm>
+            <a:off x="4458392" y="2767280"/>
+            <a:ext cx="3275214" cy="1323439"/>
+          </a:xfrm>
+          <a:prstGeom prst="rect">
+            <a:avLst/>
+          </a:prstGeom>
+          <a:noFill/>
+        </p:spPr>
+        <p:txBody>
+          <a:bodyPr wrap="square" rtlCol="0">
+            <a:spAutoFit/>
+          </a:bodyPr>
+          <a:lstStyle/>
+          <a:p>
+            <a:pPr marL="285750" indent="-285750">
+              <a:buFont typeface="Arial" panose="020B0604020202020204" pitchFamily="34" charset="0"/>
+              <a:buChar char="•"/>
+            </a:pPr>
+            <a:r>
+              <a:rPr lang="de-CH" sz="4000" dirty="0" err="1"/>
+              <a:t>animatefx</a:t>
+            </a:r>
+            <a:endParaRPr lang="de-CH" sz="4000" dirty="0"/>
+          </a:p>
+          <a:p>
+            <a:pPr marL="285750" indent="-285750">
+              <a:buFont typeface="Arial" panose="020B0604020202020204" pitchFamily="34" charset="0"/>
+              <a:buChar char="•"/>
+            </a:pPr>
+            <a:r>
+              <a:rPr lang="de-CH" sz="4000" dirty="0"/>
+              <a:t>slf4j</a:t>
+            </a:r>
+          </a:p>
+        </p:txBody>
+      </p:sp>
+    </p:spTree>
+    <p:extLst>
+      <p:ext uri="{BB962C8B-B14F-4D97-AF65-F5344CB8AC3E}">
+        <p14:creationId xmlns:p14="http://schemas.microsoft.com/office/powerpoint/2010/main" val="1573640513"/>
+      </p:ext>
+    </p:extLst>
+  </p:cSld>
+  <p:clrMapOvr>
+    <a:masterClrMapping/>
+  </p:clrMapOvr>
+</p:sld>
+</file>
+
+<file path=ppt/slides/slide12.xml><?xml version="1.0" encoding="utf-8"?>
+<p:sld xmlns:a="http://schemas.openxmlformats.org/drawingml/2006/main" xmlns:r="http://schemas.openxmlformats.org/officeDocument/2006/relationships" xmlns:p="http://schemas.openxmlformats.org/presentationml/2006/main">
+  <p:cSld>
+    <p:spTree>
+      <p:nvGrpSpPr>
+        <p:cNvPr id="1" name="">
+          <a:extLst>
+            <a:ext uri="{FF2B5EF4-FFF2-40B4-BE49-F238E27FC236}">
+              <a16:creationId xmlns:a16="http://schemas.microsoft.com/office/drawing/2014/main" id="{07EA6063-9BA7-AA75-3056-B57C7C88097E}"/>
+            </a:ext>
+          </a:extLst>
+        </p:cNvPr>
+        <p:cNvGrpSpPr/>
+        <p:nvPr/>
+      </p:nvGrpSpPr>
+      <p:grpSpPr>
+        <a:xfrm>
+          <a:off x="0" y="0"/>
+          <a:ext cx="0" cy="0"/>
+          <a:chOff x="0" y="0"/>
+          <a:chExt cx="0" cy="0"/>
+        </a:xfrm>
+      </p:grpSpPr>
+      <p:sp>
+        <p:nvSpPr>
+          <p:cNvPr id="10" name="Title 1">
+            <a:extLst>
+              <a:ext uri="{FF2B5EF4-FFF2-40B4-BE49-F238E27FC236}">
+                <a16:creationId xmlns:a16="http://schemas.microsoft.com/office/drawing/2014/main" id="{DE602A44-1951-818C-8643-1170D60073E9}"/>
+              </a:ext>
+            </a:extLst>
+          </p:cNvPr>
+          <p:cNvSpPr txBox="1">
+            <a:spLocks/>
+          </p:cNvSpPr>
+          <p:nvPr/>
+        </p:nvSpPr>
+        <p:spPr>
+          <a:xfrm>
+            <a:off x="554181" y="434109"/>
+            <a:ext cx="11083637" cy="951345"/>
+          </a:xfrm>
+          <a:prstGeom prst="rect">
+            <a:avLst/>
+          </a:prstGeom>
+          <a:solidFill>
+            <a:schemeClr val="tx1"/>
+          </a:solidFill>
+          <a:ln>
+            <a:solidFill>
+              <a:schemeClr val="tx1">
+                <a:lumMod val="95000"/>
+                <a:lumOff val="5000"/>
+              </a:schemeClr>
+            </a:solidFill>
+          </a:ln>
+          <a:effectLst>
+            <a:outerShdw blurRad="50800" dist="114300" dir="2940000" rotWithShape="0">
+              <a:prstClr val="black">
+                <a:alpha val="41000"/>
+              </a:prstClr>
+            </a:outerShdw>
+          </a:effectLst>
+        </p:spPr>
+        <p:txBody>
+          <a:bodyPr vert="horz" lIns="91440" tIns="45720" rIns="91440" bIns="45720" rtlCol="0" anchor="ctr">
+            <a:normAutofit/>
+          </a:bodyPr>
+          <a:lstStyle>
+            <a:lvl1pPr algn="ctr">
+              <a:lnSpc>
+                <a:spcPct val="90000"/>
+              </a:lnSpc>
+              <a:spcBef>
+                <a:spcPct val="0"/>
+              </a:spcBef>
+              <a:buNone/>
+              <a:defRPr sz="4000">
+                <a:solidFill>
+                  <a:schemeClr val="bg1"/>
+                </a:solidFill>
+                <a:latin typeface="Futuro"/>
+                <a:ea typeface="+mj-ea"/>
+                <a:cs typeface="Arial" panose="020B0604020202020204" pitchFamily="34" charset="0"/>
+              </a:defRPr>
+            </a:lvl1pPr>
+          </a:lstStyle>
+          <a:p>
+            <a:r>
+              <a:rPr lang="de-CH" dirty="0"/>
+              <a:t>Progress</a:t>
+            </a:r>
+          </a:p>
+        </p:txBody>
+      </p:sp>
+      <p:sp>
+        <p:nvSpPr>
+          <p:cNvPr id="8" name="Textfeld 7">
+            <a:extLst>
+              <a:ext uri="{FF2B5EF4-FFF2-40B4-BE49-F238E27FC236}">
+                <a16:creationId xmlns:a16="http://schemas.microsoft.com/office/drawing/2014/main" id="{9A2B9EA2-ED7F-4A27-D9AD-A0025A506AFF}"/>
+              </a:ext>
+            </a:extLst>
+          </p:cNvPr>
+          <p:cNvSpPr txBox="1"/>
+          <p:nvPr/>
+        </p:nvSpPr>
+        <p:spPr>
+          <a:xfrm>
+            <a:off x="2534061" y="2119281"/>
+            <a:ext cx="7123876" cy="2831544"/>
+          </a:xfrm>
+          <a:prstGeom prst="rect">
+            <a:avLst/>
+          </a:prstGeom>
+          <a:noFill/>
+        </p:spPr>
+        <p:txBody>
+          <a:bodyPr wrap="square" rtlCol="0">
+            <a:spAutoFit/>
+          </a:bodyPr>
+          <a:lstStyle/>
+          <a:p>
+            <a:pPr marL="285750" indent="-285750" algn="ctr">
+              <a:buFont typeface="Arial" panose="020B0604020202020204" pitchFamily="34" charset="0"/>
+              <a:buChar char="•"/>
+            </a:pPr>
+            <a:r>
+              <a:rPr lang="de-CH" sz="4000" dirty="0"/>
+              <a:t>OpenGL -&gt; JavaFX</a:t>
+            </a:r>
+          </a:p>
+          <a:p>
+            <a:pPr marL="285750" indent="-285750" algn="ctr">
+              <a:buFont typeface="Arial" panose="020B0604020202020204" pitchFamily="34" charset="0"/>
+              <a:buChar char="•"/>
+            </a:pPr>
+            <a:r>
+              <a:rPr lang="de-CH" sz="4000" dirty="0"/>
+              <a:t>Regelmässige Meetings</a:t>
+            </a:r>
+          </a:p>
+          <a:p>
+            <a:pPr marL="285750" indent="-285750" algn="ctr">
+              <a:buFont typeface="Arial" panose="020B0604020202020204" pitchFamily="34" charset="0"/>
+              <a:buChar char="•"/>
+            </a:pPr>
+            <a:r>
+              <a:rPr lang="de-CH" sz="4000" dirty="0"/>
+              <a:t>Flexible Aufgabenteilung</a:t>
+            </a:r>
+          </a:p>
+          <a:p>
+            <a:pPr marL="285750" indent="-285750" algn="ctr">
+              <a:buFont typeface="Arial" panose="020B0604020202020204" pitchFamily="34" charset="0"/>
+              <a:buChar char="•"/>
+            </a:pPr>
+            <a:r>
+              <a:rPr lang="de-CH" sz="4000" dirty="0"/>
+              <a:t>Gegenseitige Hilfe</a:t>
+            </a:r>
+          </a:p>
+          <a:p>
+            <a:endParaRPr lang="de-CH" dirty="0"/>
+          </a:p>
+        </p:txBody>
+      </p:sp>
+    </p:spTree>
+    <p:extLst>
+      <p:ext uri="{BB962C8B-B14F-4D97-AF65-F5344CB8AC3E}">
+        <p14:creationId xmlns:p14="http://schemas.microsoft.com/office/powerpoint/2010/main" val="340151460"/>
+      </p:ext>
+    </p:extLst>
+  </p:cSld>
+  <p:clrMapOvr>
+    <a:masterClrMapping/>
+  </p:clrMapOvr>
+</p:sld>
+</file>
+
+<file path=ppt/slides/slide13.xml><?xml version="1.0" encoding="utf-8"?>
+<p:sld xmlns:a="http://schemas.openxmlformats.org/drawingml/2006/main" xmlns:r="http://schemas.openxmlformats.org/officeDocument/2006/relationships" xmlns:p="http://schemas.openxmlformats.org/presentationml/2006/main">
+  <p:cSld>
+    <p:spTree>
+      <p:nvGrpSpPr>
+        <p:cNvPr id="1" name="">
+          <a:extLst>
+            <a:ext uri="{FF2B5EF4-FFF2-40B4-BE49-F238E27FC236}">
+              <a16:creationId xmlns:a16="http://schemas.microsoft.com/office/drawing/2014/main" id="{ED510A21-C273-9CE2-F3B3-D8C3CBF07FE5}"/>
+            </a:ext>
+          </a:extLst>
+        </p:cNvPr>
+        <p:cNvGrpSpPr/>
+        <p:nvPr/>
+      </p:nvGrpSpPr>
+      <p:grpSpPr>
+        <a:xfrm>
+          <a:off x="0" y="0"/>
+          <a:ext cx="0" cy="0"/>
+          <a:chOff x="0" y="0"/>
+          <a:chExt cx="0" cy="0"/>
+        </a:xfrm>
+      </p:grpSpPr>
+      <p:sp>
+        <p:nvSpPr>
+          <p:cNvPr id="10" name="Title 1">
+            <a:extLst>
+              <a:ext uri="{FF2B5EF4-FFF2-40B4-BE49-F238E27FC236}">
+                <a16:creationId xmlns:a16="http://schemas.microsoft.com/office/drawing/2014/main" id="{B40E7FAC-D5DC-D0DC-CAAB-CBAA1AD05375}"/>
+              </a:ext>
+            </a:extLst>
+          </p:cNvPr>
+          <p:cNvSpPr txBox="1">
+            <a:spLocks/>
+          </p:cNvSpPr>
+          <p:nvPr/>
+        </p:nvSpPr>
+        <p:spPr>
+          <a:xfrm>
+            <a:off x="554181" y="434109"/>
+            <a:ext cx="11083637" cy="951345"/>
+          </a:xfrm>
+          <a:prstGeom prst="rect">
+            <a:avLst/>
+          </a:prstGeom>
+          <a:solidFill>
+            <a:schemeClr val="tx1"/>
+          </a:solidFill>
+          <a:ln>
+            <a:solidFill>
+              <a:schemeClr val="tx1">
+                <a:lumMod val="95000"/>
+                <a:lumOff val="5000"/>
+              </a:schemeClr>
+            </a:solidFill>
+          </a:ln>
+          <a:effectLst>
+            <a:outerShdw blurRad="50800" dist="114300" dir="2940000" rotWithShape="0">
+              <a:prstClr val="black">
+                <a:alpha val="41000"/>
+              </a:prstClr>
+            </a:outerShdw>
+          </a:effectLst>
+        </p:spPr>
+        <p:txBody>
+          <a:bodyPr vert="horz" lIns="91440" tIns="45720" rIns="91440" bIns="45720" rtlCol="0" anchor="ctr">
+            <a:normAutofit/>
+          </a:bodyPr>
+          <a:lstStyle>
+            <a:lvl1pPr algn="ctr">
+              <a:lnSpc>
+                <a:spcPct val="90000"/>
+              </a:lnSpc>
+              <a:spcBef>
+                <a:spcPct val="0"/>
+              </a:spcBef>
+              <a:buNone/>
+              <a:defRPr sz="4000">
+                <a:solidFill>
+                  <a:schemeClr val="bg1"/>
+                </a:solidFill>
+                <a:latin typeface="Futuro"/>
+                <a:ea typeface="+mj-ea"/>
+                <a:cs typeface="Arial" panose="020B0604020202020204" pitchFamily="34" charset="0"/>
+              </a:defRPr>
+            </a:lvl1pPr>
+          </a:lstStyle>
+          <a:p>
+            <a:r>
+              <a:rPr lang="de-CH" dirty="0"/>
+              <a:t>Progress: Game </a:t>
+            </a:r>
+            <a:r>
+              <a:rPr lang="de-CH" dirty="0" err="1"/>
+              <a:t>Mechanics</a:t>
+            </a:r>
+            <a:endParaRPr lang="de-CH" dirty="0"/>
+          </a:p>
+        </p:txBody>
+      </p:sp>
+      <p:sp>
+        <p:nvSpPr>
+          <p:cNvPr id="8" name="Textfeld 7">
+            <a:extLst>
+              <a:ext uri="{FF2B5EF4-FFF2-40B4-BE49-F238E27FC236}">
+                <a16:creationId xmlns:a16="http://schemas.microsoft.com/office/drawing/2014/main" id="{EF59B690-9F82-EE4D-EDF4-B3DFB59B6CE6}"/>
+              </a:ext>
+            </a:extLst>
+          </p:cNvPr>
+          <p:cNvSpPr txBox="1"/>
+          <p:nvPr/>
+        </p:nvSpPr>
+        <p:spPr>
+          <a:xfrm>
+            <a:off x="2885042" y="1566952"/>
+            <a:ext cx="6421913" cy="3724096"/>
+          </a:xfrm>
+          <a:prstGeom prst="rect">
+            <a:avLst/>
+          </a:prstGeom>
+          <a:noFill/>
+        </p:spPr>
+        <p:txBody>
+          <a:bodyPr wrap="square" rtlCol="0">
+            <a:spAutoFit/>
+          </a:bodyPr>
+          <a:lstStyle/>
+          <a:p>
+            <a:pPr marL="285750" indent="-285750" algn="ctr">
+              <a:buFont typeface="Arial" panose="020B0604020202020204" pitchFamily="34" charset="0"/>
+              <a:buChar char="•"/>
+            </a:pPr>
+            <a:endParaRPr lang="de-CH" sz="3600" dirty="0"/>
+          </a:p>
+          <a:p>
+            <a:pPr algn="ctr"/>
+            <a:r>
+              <a:rPr lang="de-CH" sz="4000" dirty="0"/>
+              <a:t>Karte mit Kollisionen</a:t>
+            </a:r>
+          </a:p>
+          <a:p>
+            <a:pPr algn="ctr"/>
+            <a:r>
+              <a:rPr lang="de-CH" sz="4000" dirty="0"/>
+              <a:t>Spielerbewegung</a:t>
+            </a:r>
+          </a:p>
+          <a:p>
+            <a:pPr algn="ctr"/>
+            <a:r>
+              <a:rPr lang="de-CH" sz="4000" dirty="0"/>
+              <a:t>Rollenverteilung (zufällig)</a:t>
+            </a:r>
+          </a:p>
+          <a:p>
+            <a:pPr algn="ctr"/>
+            <a:r>
+              <a:rPr lang="de-CH" sz="4000" dirty="0"/>
+              <a:t>Catch, </a:t>
+            </a:r>
+            <a:r>
+              <a:rPr lang="de-CH" sz="4000" dirty="0" err="1"/>
+              <a:t>Revive</a:t>
+            </a:r>
+            <a:r>
+              <a:rPr lang="de-CH" sz="4000" dirty="0"/>
+              <a:t> und Terminals</a:t>
+            </a:r>
+          </a:p>
+          <a:p>
+            <a:pPr algn="ctr"/>
+            <a:r>
+              <a:rPr lang="de-CH" sz="4000" dirty="0"/>
+              <a:t>Gewinnbedingungen</a:t>
+            </a:r>
+          </a:p>
+        </p:txBody>
+      </p:sp>
+    </p:spTree>
+    <p:extLst>
+      <p:ext uri="{BB962C8B-B14F-4D97-AF65-F5344CB8AC3E}">
+        <p14:creationId xmlns:p14="http://schemas.microsoft.com/office/powerpoint/2010/main" val="291269191"/>
+      </p:ext>
+    </p:extLst>
+  </p:cSld>
+  <p:clrMapOvr>
+    <a:masterClrMapping/>
+  </p:clrMapOvr>
+</p:sld>
+</file>
+
+<file path=ppt/slides/slide14.xml><?xml version="1.0" encoding="utf-8"?>
+<p:sld xmlns:a="http://schemas.openxmlformats.org/drawingml/2006/main" xmlns:r="http://schemas.openxmlformats.org/officeDocument/2006/relationships" xmlns:p="http://schemas.openxmlformats.org/presentationml/2006/main">
+  <p:cSld>
+    <p:spTree>
+      <p:nvGrpSpPr>
+        <p:cNvPr id="1" name="">
+          <a:extLst>
+            <a:ext uri="{FF2B5EF4-FFF2-40B4-BE49-F238E27FC236}">
+              <a16:creationId xmlns:a16="http://schemas.microsoft.com/office/drawing/2014/main" id="{3ED91B24-E137-EF4A-7F9F-345D10811D4A}"/>
+            </a:ext>
+          </a:extLst>
+        </p:cNvPr>
+        <p:cNvGrpSpPr/>
+        <p:nvPr/>
+      </p:nvGrpSpPr>
+      <p:grpSpPr>
+        <a:xfrm>
+          <a:off x="0" y="0"/>
+          <a:ext cx="0" cy="0"/>
+          <a:chOff x="0" y="0"/>
+          <a:chExt cx="0" cy="0"/>
+        </a:xfrm>
+      </p:grpSpPr>
+      <p:sp>
+        <p:nvSpPr>
+          <p:cNvPr id="10" name="Title 1">
+            <a:extLst>
+              <a:ext uri="{FF2B5EF4-FFF2-40B4-BE49-F238E27FC236}">
+                <a16:creationId xmlns:a16="http://schemas.microsoft.com/office/drawing/2014/main" id="{1928ED88-8B1A-4B9C-9B41-34F9D7CEF4B5}"/>
+              </a:ext>
+            </a:extLst>
+          </p:cNvPr>
+          <p:cNvSpPr txBox="1">
+            <a:spLocks/>
+          </p:cNvSpPr>
+          <p:nvPr/>
+        </p:nvSpPr>
+        <p:spPr>
+          <a:xfrm>
+            <a:off x="554181" y="434109"/>
+            <a:ext cx="11083637" cy="951345"/>
+          </a:xfrm>
+          <a:prstGeom prst="rect">
+            <a:avLst/>
+          </a:prstGeom>
+          <a:solidFill>
+            <a:schemeClr val="tx1"/>
+          </a:solidFill>
+          <a:ln>
+            <a:solidFill>
+              <a:schemeClr val="tx1">
+                <a:lumMod val="95000"/>
+                <a:lumOff val="5000"/>
+              </a:schemeClr>
+            </a:solidFill>
+          </a:ln>
+          <a:effectLst>
+            <a:outerShdw blurRad="50800" dist="114300" dir="2940000" rotWithShape="0">
+              <a:prstClr val="black">
+                <a:alpha val="41000"/>
+              </a:prstClr>
+            </a:outerShdw>
+          </a:effectLst>
+        </p:spPr>
+        <p:txBody>
+          <a:bodyPr vert="horz" lIns="91440" tIns="45720" rIns="91440" bIns="45720" rtlCol="0" anchor="ctr">
+            <a:normAutofit/>
+          </a:bodyPr>
+          <a:lstStyle>
+            <a:lvl1pPr algn="ctr">
+              <a:lnSpc>
+                <a:spcPct val="90000"/>
+              </a:lnSpc>
+              <a:spcBef>
+                <a:spcPct val="0"/>
+              </a:spcBef>
+              <a:buNone/>
+              <a:defRPr sz="4000">
+                <a:solidFill>
+                  <a:schemeClr val="bg1"/>
+                </a:solidFill>
+                <a:latin typeface="Futuro"/>
+                <a:ea typeface="+mj-ea"/>
+                <a:cs typeface="Arial" panose="020B0604020202020204" pitchFamily="34" charset="0"/>
+              </a:defRPr>
+            </a:lvl1pPr>
+          </a:lstStyle>
+          <a:p>
+            <a:r>
+              <a:rPr lang="de-CH" dirty="0"/>
+              <a:t>Progress: Game </a:t>
+            </a:r>
+            <a:r>
+              <a:rPr lang="de-CH" dirty="0" err="1"/>
+              <a:t>Mechanics</a:t>
+            </a:r>
+            <a:endParaRPr lang="de-CH" dirty="0"/>
+          </a:p>
+        </p:txBody>
+      </p:sp>
+      <p:sp>
+        <p:nvSpPr>
+          <p:cNvPr id="8" name="Textfeld 7">
+            <a:extLst>
+              <a:ext uri="{FF2B5EF4-FFF2-40B4-BE49-F238E27FC236}">
+                <a16:creationId xmlns:a16="http://schemas.microsoft.com/office/drawing/2014/main" id="{430E081C-94B2-0C5D-1BCE-9B67F2205689}"/>
+              </a:ext>
+            </a:extLst>
+          </p:cNvPr>
+          <p:cNvSpPr txBox="1"/>
+          <p:nvPr/>
+        </p:nvSpPr>
+        <p:spPr>
+          <a:xfrm>
+            <a:off x="2885042" y="2151727"/>
+            <a:ext cx="6421913" cy="2554545"/>
+          </a:xfrm>
+          <a:prstGeom prst="rect">
+            <a:avLst/>
+          </a:prstGeom>
+          <a:noFill/>
+        </p:spPr>
+        <p:txBody>
+          <a:bodyPr wrap="square" rtlCol="0">
+            <a:spAutoFit/>
+          </a:bodyPr>
+          <a:lstStyle/>
+          <a:p>
+            <a:pPr algn="ctr"/>
+            <a:r>
+              <a:rPr lang="de-CH" sz="4000" dirty="0"/>
+              <a:t>Fenster für die Ziege</a:t>
+            </a:r>
+          </a:p>
+          <a:p>
+            <a:pPr algn="ctr"/>
+            <a:r>
+              <a:rPr lang="de-CH" sz="4000" dirty="0"/>
+              <a:t>Befreiung der Ziege</a:t>
+            </a:r>
+          </a:p>
+          <a:p>
+            <a:pPr algn="ctr"/>
+            <a:r>
+              <a:rPr lang="de-CH" sz="4000" dirty="0"/>
+              <a:t>Roboterladestationen</a:t>
+            </a:r>
+          </a:p>
+          <a:p>
+            <a:pPr algn="ctr"/>
+            <a:r>
+              <a:rPr lang="de-CH" sz="4000" dirty="0"/>
+              <a:t>Pixel Arts</a:t>
+            </a:r>
+          </a:p>
+        </p:txBody>
+      </p:sp>
+    </p:spTree>
+    <p:extLst>
+      <p:ext uri="{BB962C8B-B14F-4D97-AF65-F5344CB8AC3E}">
+        <p14:creationId xmlns:p14="http://schemas.microsoft.com/office/powerpoint/2010/main" val="2705868627"/>
+      </p:ext>
+    </p:extLst>
+  </p:cSld>
+  <p:clrMapOvr>
+    <a:masterClrMapping/>
+  </p:clrMapOvr>
+</p:sld>
+</file>
+
+<file path=ppt/slides/slide15.xml><?xml version="1.0" encoding="utf-8"?>
+<p:sld xmlns:a="http://schemas.openxmlformats.org/drawingml/2006/main" xmlns:r="http://schemas.openxmlformats.org/officeDocument/2006/relationships" xmlns:p="http://schemas.openxmlformats.org/presentationml/2006/main">
+  <p:cSld>
+    <p:spTree>
+      <p:nvGrpSpPr>
+        <p:cNvPr id="1" name="">
+          <a:extLst>
+            <a:ext uri="{FF2B5EF4-FFF2-40B4-BE49-F238E27FC236}">
+              <a16:creationId xmlns:a16="http://schemas.microsoft.com/office/drawing/2014/main" id="{2F41C5F4-9252-E48B-1C9D-CEEC7FE717B9}"/>
+            </a:ext>
+          </a:extLst>
+        </p:cNvPr>
+        <p:cNvGrpSpPr/>
+        <p:nvPr/>
+      </p:nvGrpSpPr>
+      <p:grpSpPr>
+        <a:xfrm>
+          <a:off x="0" y="0"/>
+          <a:ext cx="0" cy="0"/>
+          <a:chOff x="0" y="0"/>
+          <a:chExt cx="0" cy="0"/>
+        </a:xfrm>
+      </p:grpSpPr>
+      <p:sp>
+        <p:nvSpPr>
+          <p:cNvPr id="10" name="Title 1">
+            <a:extLst>
+              <a:ext uri="{FF2B5EF4-FFF2-40B4-BE49-F238E27FC236}">
+                <a16:creationId xmlns:a16="http://schemas.microsoft.com/office/drawing/2014/main" id="{1DFCE528-91F5-F2B1-C28F-639AC274B9E4}"/>
+              </a:ext>
+            </a:extLst>
+          </p:cNvPr>
+          <p:cNvSpPr txBox="1">
+            <a:spLocks/>
+          </p:cNvSpPr>
+          <p:nvPr/>
+        </p:nvSpPr>
+        <p:spPr>
+          <a:xfrm>
+            <a:off x="554181" y="434109"/>
+            <a:ext cx="11083637" cy="951345"/>
+          </a:xfrm>
+          <a:prstGeom prst="rect">
+            <a:avLst/>
+          </a:prstGeom>
+          <a:solidFill>
+            <a:schemeClr val="tx1"/>
+          </a:solidFill>
+          <a:ln>
+            <a:solidFill>
+              <a:schemeClr val="tx1">
+                <a:lumMod val="95000"/>
+                <a:lumOff val="5000"/>
+              </a:schemeClr>
+            </a:solidFill>
+          </a:ln>
+          <a:effectLst>
+            <a:outerShdw blurRad="50800" dist="114300" dir="2940000" rotWithShape="0">
+              <a:prstClr val="black">
+                <a:alpha val="41000"/>
+              </a:prstClr>
+            </a:outerShdw>
+          </a:effectLst>
+        </p:spPr>
+        <p:txBody>
+          <a:bodyPr vert="horz" lIns="91440" tIns="45720" rIns="91440" bIns="45720" rtlCol="0" anchor="ctr">
+            <a:normAutofit/>
+          </a:bodyPr>
+          <a:lstStyle>
+            <a:lvl1pPr algn="ctr">
+              <a:lnSpc>
+                <a:spcPct val="90000"/>
+              </a:lnSpc>
+              <a:spcBef>
+                <a:spcPct val="0"/>
+              </a:spcBef>
+              <a:buNone/>
+              <a:defRPr sz="4000">
+                <a:solidFill>
+                  <a:schemeClr val="bg1"/>
+                </a:solidFill>
+                <a:latin typeface="Futuro"/>
+                <a:ea typeface="+mj-ea"/>
+                <a:cs typeface="Arial" panose="020B0604020202020204" pitchFamily="34" charset="0"/>
+              </a:defRPr>
+            </a:lvl1pPr>
+          </a:lstStyle>
+          <a:p>
+            <a:r>
+              <a:rPr lang="de-CH" dirty="0"/>
+              <a:t>Questions?</a:t>
+            </a:r>
+          </a:p>
+        </p:txBody>
+      </p:sp>
+      <p:pic>
+        <p:nvPicPr>
+          <p:cNvPr id="4" name="Inhaltsplatzhalter 4" descr="Ein Bild, das Schwarz, Dunkelheit enthält.&#10;&#10;KI-generierte Inhalte können fehlerhaft sein.">
+            <a:extLst>
+              <a:ext uri="{FF2B5EF4-FFF2-40B4-BE49-F238E27FC236}">
+                <a16:creationId xmlns:a16="http://schemas.microsoft.com/office/drawing/2014/main" id="{F35E51AB-45AC-5410-C060-5A377D032598}"/>
+              </a:ext>
+            </a:extLst>
+          </p:cNvPr>
+          <p:cNvPicPr>
+            <a:picLocks noGrp="1" noChangeAspect="1"/>
+          </p:cNvPicPr>
+          <p:nvPr>
+            <p:ph idx="1"/>
+          </p:nvPr>
+        </p:nvPicPr>
+        <p:blipFill>
+          <a:blip r:embed="rId2">
+            <a:extLst>
+              <a:ext uri="{28A0092B-C50C-407E-A947-70E740481C1C}">
+                <a14:useLocalDpi xmlns:a14="http://schemas.microsoft.com/office/drawing/2010/main" val="0"/>
+              </a:ext>
+            </a:extLst>
+          </a:blip>
+          <a:stretch>
+            <a:fillRect/>
+          </a:stretch>
+        </p:blipFill>
+        <p:spPr>
+          <a:xfrm>
+            <a:off x="1783216" y="1808491"/>
+            <a:ext cx="8625566" cy="3241018"/>
+          </a:xfrm>
+        </p:spPr>
+      </p:pic>
+      <p:pic>
+        <p:nvPicPr>
+          <p:cNvPr id="6" name="Picture 2" descr="I googled &quot;white background&quot; and saved this image. Later, I found out this  is not a real white background... (zoom in) : r/mildlyinfuriating">
+            <a:extLst>
+              <a:ext uri="{FF2B5EF4-FFF2-40B4-BE49-F238E27FC236}">
+                <a16:creationId xmlns:a16="http://schemas.microsoft.com/office/drawing/2014/main" id="{5A009858-A3F6-3FA0-62D2-FE844FB7042E}"/>
+              </a:ext>
+            </a:extLst>
+          </p:cNvPr>
+          <p:cNvPicPr>
+            <a:picLocks noChangeAspect="1" noChangeArrowheads="1"/>
+          </p:cNvPicPr>
+          <p:nvPr/>
+        </p:nvPicPr>
+        <p:blipFill>
+          <a:blip r:embed="rId3">
+            <a:extLst>
+              <a:ext uri="{28A0092B-C50C-407E-A947-70E740481C1C}">
+                <a14:useLocalDpi xmlns:a14="http://schemas.microsoft.com/office/drawing/2010/main" val="0"/>
+              </a:ext>
+            </a:extLst>
+          </a:blip>
+          <a:srcRect/>
+          <a:stretch>
+            <a:fillRect/>
+          </a:stretch>
+        </p:blipFill>
+        <p:spPr bwMode="auto">
+          <a:xfrm>
+            <a:off x="9626138" y="5358574"/>
+            <a:ext cx="2565862" cy="1499426"/>
+          </a:xfrm>
+          <a:prstGeom prst="rect">
+            <a:avLst/>
+          </a:prstGeom>
+          <a:noFill/>
+          <a:extLst>
+            <a:ext uri="{909E8E84-426E-40DD-AFC4-6F175D3DCCD1}">
+              <a14:hiddenFill xmlns:a14="http://schemas.microsoft.com/office/drawing/2010/main">
+                <a:solidFill>
+                  <a:srgbClr val="FFFFFF"/>
+                </a:solidFill>
+              </a14:hiddenFill>
+            </a:ext>
+          </a:extLst>
+        </p:spPr>
+      </p:pic>
+    </p:spTree>
+    <p:extLst>
+      <p:ext uri="{BB962C8B-B14F-4D97-AF65-F5344CB8AC3E}">
+        <p14:creationId xmlns:p14="http://schemas.microsoft.com/office/powerpoint/2010/main" val="8550682"/>
       </p:ext>
     </p:extLst>
   </p:cSld>

</xml_diff>